<commit_message>
added presenter names to 1st slide
</commit_message>
<xml_diff>
--- a/docs/revised-tuesday.pptx
+++ b/docs/revised-tuesday.pptx
@@ -279,8 +279,11 @@
     </a:lvl9pPr>
   </p:defaultTextStyle>
   <p:extLst>
+    <p:ext uri="{EFAFB233-063F-42B5-8137-9DF3F51BA10A}">
+      <p15:sldGuideLst xmlns:p15="http://schemas.microsoft.com/office/powerpoint/2012/main"/>
+    </p:ext>
     <p:ext uri="GoogleSlidesCustomDataVersion2">
-      <go:slidesCustomData xmlns:go="http://customooxmlschemas.google.com/" xmlns:ahyp="http://schemas.microsoft.com/office/drawing/2018/hyperlinkcolor" xmlns:p15="http://schemas.microsoft.com/office/powerpoint/2012/main" xmlns:p14="http://schemas.microsoft.com/office/powerpoint/2010/main" xmlns:com="http://schemas.openxmlformats.org/drawingml/2006/compatibility" xmlns:pvml="urn:schemas-microsoft-com:office:powerpoint" xmlns:v="urn:schemas-microsoft-com:vml" xmlns:o="urn:schemas-microsoft-com:office:office" xmlns:dgm="http://schemas.openxmlformats.org/drawingml/2006/diagram" xmlns:c="http://schemas.openxmlformats.org/drawingml/2006/chart" xmlns:mv="urn:schemas-microsoft-com:mac:vml" xmlns:mc="http://schemas.openxmlformats.org/markup-compatibility/2006" xmlns="" r:id="rId37" roundtripDataSignature="AMtx7mhWZ+TzVBnjONCyU6yKWO/E+J6Yhg=="/>
+      <go:slidesCustomData xmlns="" xmlns:mc="http://schemas.openxmlformats.org/markup-compatibility/2006" xmlns:mv="urn:schemas-microsoft-com:mac:vml" xmlns:c="http://schemas.openxmlformats.org/drawingml/2006/chart" xmlns:dgm="http://schemas.openxmlformats.org/drawingml/2006/diagram" xmlns:o="urn:schemas-microsoft-com:office:office" xmlns:v="urn:schemas-microsoft-com:vml" xmlns:pvml="urn:schemas-microsoft-com:office:powerpoint" xmlns:com="http://schemas.openxmlformats.org/drawingml/2006/compatibility" xmlns:p14="http://schemas.microsoft.com/office/powerpoint/2010/main" xmlns:p15="http://schemas.microsoft.com/office/powerpoint/2012/main" xmlns:ahyp="http://schemas.microsoft.com/office/drawing/2018/hyperlinkcolor" xmlns:go="http://customooxmlschemas.google.com/" r:id="rId37" roundtripDataSignature="AMtx7mhWZ+TzVBnjONCyU6yKWO/E+J6Yhg=="/>
     </p:ext>
   </p:extLst>
 </p:presentation>
@@ -25980,10 +25983,10 @@
               <a:buNone/>
             </a:pPr>
             <a:r>
-              <a:rPr lang="en-CA"/>
+              <a:rPr lang="en-CA" dirty="0"/>
               <a:t>Microsoft Agent Framework Workshop</a:t>
             </a:r>
-            <a:endParaRPr/>
+            <a:endParaRPr dirty="0"/>
           </a:p>
         </p:txBody>
       </p:sp>
@@ -26032,7 +26035,15 @@
               <a:buSzPts val="2400"/>
               <a:buNone/>
             </a:pPr>
-            <a:endParaRPr/>
+            <a:r>
+              <a:rPr lang="en-CA" dirty="0" err="1"/>
+              <a:t>Mehrthur</a:t>
+            </a:r>
+            <a:r>
+              <a:rPr lang="en-CA" dirty="0"/>
+              <a:t> Silva &amp; Medhat Elmasry </a:t>
+            </a:r>
+            <a:endParaRPr dirty="0"/>
           </a:p>
         </p:txBody>
       </p:sp>

</xml_diff>